<commit_message>
Add additional links. Redo data growth chart
</commit_message>
<xml_diff>
--- a/media/Presentation1.pptx
+++ b/media/Presentation1.pptx
@@ -7,6 +7,7 @@
   <p:sldIdLst>
     <p:sldId id="256" r:id="rId2"/>
     <p:sldId id="257" r:id="rId3"/>
+    <p:sldId id="258" r:id="rId4"/>
   </p:sldIdLst>
   <p:sldSz cx="12192000" cy="6858000"/>
   <p:notesSz cx="6858000" cy="9144000"/>
@@ -244,7 +245,7 @@
           <a:p>
             <a:fld id="{1AA74684-F62B-4704-B07A-951205872129}" type="datetimeFigureOut">
               <a:rPr lang="en-US" smtClean="0"/>
-              <a:t>4/7/2016</a:t>
+              <a:t>4/12/2016</a:t>
             </a:fld>
             <a:endParaRPr lang="en-US"/>
           </a:p>
@@ -414,7 +415,7 @@
           <a:p>
             <a:fld id="{1AA74684-F62B-4704-B07A-951205872129}" type="datetimeFigureOut">
               <a:rPr lang="en-US" smtClean="0"/>
-              <a:t>4/7/2016</a:t>
+              <a:t>4/12/2016</a:t>
             </a:fld>
             <a:endParaRPr lang="en-US"/>
           </a:p>
@@ -594,7 +595,7 @@
           <a:p>
             <a:fld id="{1AA74684-F62B-4704-B07A-951205872129}" type="datetimeFigureOut">
               <a:rPr lang="en-US" smtClean="0"/>
-              <a:t>4/7/2016</a:t>
+              <a:t>4/12/2016</a:t>
             </a:fld>
             <a:endParaRPr lang="en-US"/>
           </a:p>
@@ -764,7 +765,7 @@
           <a:p>
             <a:fld id="{1AA74684-F62B-4704-B07A-951205872129}" type="datetimeFigureOut">
               <a:rPr lang="en-US" smtClean="0"/>
-              <a:t>4/7/2016</a:t>
+              <a:t>4/12/2016</a:t>
             </a:fld>
             <a:endParaRPr lang="en-US"/>
           </a:p>
@@ -1010,7 +1011,7 @@
           <a:p>
             <a:fld id="{1AA74684-F62B-4704-B07A-951205872129}" type="datetimeFigureOut">
               <a:rPr lang="en-US" smtClean="0"/>
-              <a:t>4/7/2016</a:t>
+              <a:t>4/12/2016</a:t>
             </a:fld>
             <a:endParaRPr lang="en-US"/>
           </a:p>
@@ -1242,7 +1243,7 @@
           <a:p>
             <a:fld id="{1AA74684-F62B-4704-B07A-951205872129}" type="datetimeFigureOut">
               <a:rPr lang="en-US" smtClean="0"/>
-              <a:t>4/7/2016</a:t>
+              <a:t>4/12/2016</a:t>
             </a:fld>
             <a:endParaRPr lang="en-US"/>
           </a:p>
@@ -1609,7 +1610,7 @@
           <a:p>
             <a:fld id="{1AA74684-F62B-4704-B07A-951205872129}" type="datetimeFigureOut">
               <a:rPr lang="en-US" smtClean="0"/>
-              <a:t>4/7/2016</a:t>
+              <a:t>4/12/2016</a:t>
             </a:fld>
             <a:endParaRPr lang="en-US"/>
           </a:p>
@@ -1727,7 +1728,7 @@
           <a:p>
             <a:fld id="{1AA74684-F62B-4704-B07A-951205872129}" type="datetimeFigureOut">
               <a:rPr lang="en-US" smtClean="0"/>
-              <a:t>4/7/2016</a:t>
+              <a:t>4/12/2016</a:t>
             </a:fld>
             <a:endParaRPr lang="en-US"/>
           </a:p>
@@ -1822,7 +1823,7 @@
           <a:p>
             <a:fld id="{1AA74684-F62B-4704-B07A-951205872129}" type="datetimeFigureOut">
               <a:rPr lang="en-US" smtClean="0"/>
-              <a:t>4/7/2016</a:t>
+              <a:t>4/12/2016</a:t>
             </a:fld>
             <a:endParaRPr lang="en-US"/>
           </a:p>
@@ -2099,7 +2100,7 @@
           <a:p>
             <a:fld id="{1AA74684-F62B-4704-B07A-951205872129}" type="datetimeFigureOut">
               <a:rPr lang="en-US" smtClean="0"/>
-              <a:t>4/7/2016</a:t>
+              <a:t>4/12/2016</a:t>
             </a:fld>
             <a:endParaRPr lang="en-US"/>
           </a:p>
@@ -2352,7 +2353,7 @@
           <a:p>
             <a:fld id="{1AA74684-F62B-4704-B07A-951205872129}" type="datetimeFigureOut">
               <a:rPr lang="en-US" smtClean="0"/>
-              <a:t>4/7/2016</a:t>
+              <a:t>4/12/2016</a:t>
             </a:fld>
             <a:endParaRPr lang="en-US"/>
           </a:p>
@@ -2565,7 +2566,7 @@
           <a:p>
             <a:fld id="{1AA74684-F62B-4704-B07A-951205872129}" type="datetimeFigureOut">
               <a:rPr lang="en-US" smtClean="0"/>
-              <a:t>4/7/2016</a:t>
+              <a:t>4/12/2016</a:t>
             </a:fld>
             <a:endParaRPr lang="en-US"/>
           </a:p>
@@ -3293,61 +3294,45 @@
                   <a:srgbClr val="FF0000"/>
                 </a:solidFill>
               </a:rPr>
-              <a:t>Real time </a:t>
-            </a:r>
+              <a:t>Real time data pipeline</a:t>
+            </a:r>
+            <a:endParaRPr lang="en-US" b="1" dirty="0">
+              <a:solidFill>
+                <a:srgbClr val="FF0000"/>
+              </a:solidFill>
+            </a:endParaRPr>
+          </a:p>
+        </p:txBody>
+      </p:sp>
+      <p:sp>
+        <p:nvSpPr>
+          <p:cNvPr id="11" name="TextBox 10"/>
+          <p:cNvSpPr txBox="1"/>
+          <p:nvPr/>
+        </p:nvSpPr>
+        <p:spPr>
+          <a:xfrm>
+            <a:off x="563220" y="4454372"/>
+            <a:ext cx="1455821" cy="646331"/>
+          </a:xfrm>
+          <a:prstGeom prst="rect">
+            <a:avLst/>
+          </a:prstGeom>
+          <a:noFill/>
+        </p:spPr>
+        <p:txBody>
+          <a:bodyPr wrap="square" rtlCol="0">
+            <a:spAutoFit/>
+          </a:bodyPr>
+          <a:lstStyle/>
+          <a:p>
             <a:r>
               <a:rPr lang="en-US" b="1" dirty="0" smtClean="0">
                 <a:solidFill>
                   <a:srgbClr val="FF0000"/>
                 </a:solidFill>
               </a:rPr>
-              <a:t>data pipeline</a:t>
-            </a:r>
-            <a:endParaRPr lang="en-US" b="1" dirty="0">
-              <a:solidFill>
-                <a:srgbClr val="FF0000"/>
-              </a:solidFill>
-            </a:endParaRPr>
-          </a:p>
-        </p:txBody>
-      </p:sp>
-      <p:sp>
-        <p:nvSpPr>
-          <p:cNvPr id="11" name="TextBox 10"/>
-          <p:cNvSpPr txBox="1"/>
-          <p:nvPr/>
-        </p:nvSpPr>
-        <p:spPr>
-          <a:xfrm>
-            <a:off x="563220" y="4454372"/>
-            <a:ext cx="1455821" cy="646331"/>
-          </a:xfrm>
-          <a:prstGeom prst="rect">
-            <a:avLst/>
-          </a:prstGeom>
-          <a:noFill/>
-        </p:spPr>
-        <p:txBody>
-          <a:bodyPr wrap="square" rtlCol="0">
-            <a:spAutoFit/>
-          </a:bodyPr>
-          <a:lstStyle/>
-          <a:p>
-            <a:r>
-              <a:rPr lang="en-US" b="1" dirty="0" smtClean="0">
-                <a:solidFill>
-                  <a:srgbClr val="FF0000"/>
-                </a:solidFill>
-              </a:rPr>
-              <a:t>Predictive </a:t>
-            </a:r>
-            <a:r>
-              <a:rPr lang="en-US" b="1" dirty="0" smtClean="0">
-                <a:solidFill>
-                  <a:srgbClr val="FF0000"/>
-                </a:solidFill>
-              </a:rPr>
-              <a:t>data pipeline</a:t>
+              <a:t>Predictive data pipeline</a:t>
             </a:r>
             <a:endParaRPr lang="en-US" b="1" dirty="0">
               <a:solidFill>
@@ -3434,6 +3419,754 @@
     <p:extLst>
       <p:ext uri="{BB962C8B-B14F-4D97-AF65-F5344CB8AC3E}">
         <p14:creationId xmlns:p14="http://schemas.microsoft.com/office/powerpoint/2010/main" val="334896561"/>
+      </p:ext>
+    </p:extLst>
+  </p:cSld>
+  <p:clrMapOvr>
+    <a:masterClrMapping/>
+  </p:clrMapOvr>
+</p:sld>
+</file>
+
+<file path=ppt/slides/slide3.xml><?xml version="1.0" encoding="utf-8"?>
+<p:sld xmlns:a="http://schemas.openxmlformats.org/drawingml/2006/main" xmlns:r="http://schemas.openxmlformats.org/officeDocument/2006/relationships" xmlns:p="http://schemas.openxmlformats.org/presentationml/2006/main">
+  <p:cSld>
+    <p:spTree>
+      <p:nvGrpSpPr>
+        <p:cNvPr id="1" name=""/>
+        <p:cNvGrpSpPr/>
+        <p:nvPr/>
+      </p:nvGrpSpPr>
+      <p:grpSpPr>
+        <a:xfrm>
+          <a:off x="0" y="0"/>
+          <a:ext cx="0" cy="0"/>
+          <a:chOff x="0" y="0"/>
+          <a:chExt cx="0" cy="0"/>
+        </a:xfrm>
+      </p:grpSpPr>
+      <p:cxnSp>
+        <p:nvCxnSpPr>
+          <p:cNvPr id="5" name="Straight Arrow Connector 4"/>
+          <p:cNvCxnSpPr/>
+          <p:nvPr/>
+        </p:nvCxnSpPr>
+        <p:spPr>
+          <a:xfrm>
+            <a:off x="2045110" y="5895719"/>
+            <a:ext cx="7818120" cy="3637"/>
+          </a:xfrm>
+          <a:prstGeom prst="straightConnector1">
+            <a:avLst/>
+          </a:prstGeom>
+          <a:ln w="31750">
+            <a:solidFill>
+              <a:schemeClr val="tx1"/>
+            </a:solidFill>
+            <a:tailEnd type="triangle"/>
+          </a:ln>
+        </p:spPr>
+        <p:style>
+          <a:lnRef idx="1">
+            <a:schemeClr val="accent1"/>
+          </a:lnRef>
+          <a:fillRef idx="0">
+            <a:schemeClr val="accent1"/>
+          </a:fillRef>
+          <a:effectRef idx="0">
+            <a:schemeClr val="accent1"/>
+          </a:effectRef>
+          <a:fontRef idx="minor">
+            <a:schemeClr val="tx1"/>
+          </a:fontRef>
+        </p:style>
+      </p:cxnSp>
+      <p:sp>
+        <p:nvSpPr>
+          <p:cNvPr id="6" name="Rectangle 5"/>
+          <p:cNvSpPr/>
+          <p:nvPr/>
+        </p:nvSpPr>
+        <p:spPr>
+          <a:xfrm>
+            <a:off x="-1137438" y="6659269"/>
+            <a:ext cx="7818120" cy="4681728"/>
+          </a:xfrm>
+          <a:prstGeom prst="rect">
+            <a:avLst/>
+          </a:prstGeom>
+        </p:spPr>
+        <p:style>
+          <a:lnRef idx="2">
+            <a:schemeClr val="accent1">
+              <a:shade val="50000"/>
+            </a:schemeClr>
+          </a:lnRef>
+          <a:fillRef idx="1">
+            <a:schemeClr val="accent1"/>
+          </a:fillRef>
+          <a:effectRef idx="0">
+            <a:schemeClr val="accent1"/>
+          </a:effectRef>
+          <a:fontRef idx="minor">
+            <a:schemeClr val="lt1"/>
+          </a:fontRef>
+        </p:style>
+        <p:txBody>
+          <a:bodyPr rtlCol="0" anchor="ctr"/>
+          <a:lstStyle/>
+          <a:p>
+            <a:pPr algn="ctr"/>
+            <a:endParaRPr lang="en-US"/>
+          </a:p>
+        </p:txBody>
+      </p:sp>
+      <p:cxnSp>
+        <p:nvCxnSpPr>
+          <p:cNvPr id="10" name="Straight Arrow Connector 9"/>
+          <p:cNvCxnSpPr/>
+          <p:nvPr/>
+        </p:nvCxnSpPr>
+        <p:spPr>
+          <a:xfrm flipV="1">
+            <a:off x="2054942" y="1125005"/>
+            <a:ext cx="13673" cy="4774351"/>
+          </a:xfrm>
+          <a:prstGeom prst="straightConnector1">
+            <a:avLst/>
+          </a:prstGeom>
+          <a:ln w="31750">
+            <a:solidFill>
+              <a:schemeClr val="tx1"/>
+            </a:solidFill>
+            <a:tailEnd type="triangle"/>
+          </a:ln>
+        </p:spPr>
+        <p:style>
+          <a:lnRef idx="1">
+            <a:schemeClr val="accent1"/>
+          </a:lnRef>
+          <a:fillRef idx="0">
+            <a:schemeClr val="accent1"/>
+          </a:fillRef>
+          <a:effectRef idx="0">
+            <a:schemeClr val="accent1"/>
+          </a:effectRef>
+          <a:fontRef idx="minor">
+            <a:schemeClr val="tx1"/>
+          </a:fontRef>
+        </p:style>
+      </p:cxnSp>
+      <p:sp>
+        <p:nvSpPr>
+          <p:cNvPr id="25" name="TextBox 24"/>
+          <p:cNvSpPr txBox="1"/>
+          <p:nvPr/>
+        </p:nvSpPr>
+        <p:spPr>
+          <a:xfrm>
+            <a:off x="2299674" y="5074763"/>
+            <a:ext cx="471948" cy="369332"/>
+          </a:xfrm>
+          <a:prstGeom prst="rect">
+            <a:avLst/>
+          </a:prstGeom>
+          <a:noFill/>
+        </p:spPr>
+        <p:txBody>
+          <a:bodyPr wrap="square" rtlCol="0">
+            <a:spAutoFit/>
+          </a:bodyPr>
+          <a:lstStyle/>
+          <a:p>
+            <a:r>
+              <a:rPr lang="en-US" dirty="0" smtClean="0"/>
+              <a:t>GB</a:t>
+            </a:r>
+            <a:endParaRPr lang="en-US" dirty="0"/>
+          </a:p>
+        </p:txBody>
+      </p:sp>
+      <p:sp>
+        <p:nvSpPr>
+          <p:cNvPr id="26" name="TextBox 25"/>
+          <p:cNvSpPr txBox="1"/>
+          <p:nvPr/>
+        </p:nvSpPr>
+        <p:spPr>
+          <a:xfrm>
+            <a:off x="3962400" y="4565716"/>
+            <a:ext cx="471948" cy="369332"/>
+          </a:xfrm>
+          <a:prstGeom prst="rect">
+            <a:avLst/>
+          </a:prstGeom>
+          <a:noFill/>
+        </p:spPr>
+        <p:txBody>
+          <a:bodyPr wrap="square" rtlCol="0">
+            <a:spAutoFit/>
+          </a:bodyPr>
+          <a:lstStyle/>
+          <a:p>
+            <a:r>
+              <a:rPr lang="en-US" dirty="0" smtClean="0"/>
+              <a:t>TB</a:t>
+            </a:r>
+            <a:endParaRPr lang="en-US" dirty="0"/>
+          </a:p>
+        </p:txBody>
+      </p:sp>
+      <p:sp>
+        <p:nvSpPr>
+          <p:cNvPr id="27" name="TextBox 26"/>
+          <p:cNvSpPr txBox="1"/>
+          <p:nvPr/>
+        </p:nvSpPr>
+        <p:spPr>
+          <a:xfrm>
+            <a:off x="5449746" y="3580728"/>
+            <a:ext cx="471948" cy="369332"/>
+          </a:xfrm>
+          <a:prstGeom prst="rect">
+            <a:avLst/>
+          </a:prstGeom>
+          <a:noFill/>
+        </p:spPr>
+        <p:txBody>
+          <a:bodyPr wrap="square" rtlCol="0">
+            <a:spAutoFit/>
+          </a:bodyPr>
+          <a:lstStyle/>
+          <a:p>
+            <a:r>
+              <a:rPr lang="en-US" dirty="0" smtClean="0"/>
+              <a:t>PB</a:t>
+            </a:r>
+            <a:endParaRPr lang="en-US" dirty="0"/>
+          </a:p>
+        </p:txBody>
+      </p:sp>
+      <p:sp>
+        <p:nvSpPr>
+          <p:cNvPr id="28" name="TextBox 27"/>
+          <p:cNvSpPr txBox="1"/>
+          <p:nvPr/>
+        </p:nvSpPr>
+        <p:spPr>
+          <a:xfrm>
+            <a:off x="6784259" y="2534818"/>
+            <a:ext cx="471948" cy="369332"/>
+          </a:xfrm>
+          <a:prstGeom prst="rect">
+            <a:avLst/>
+          </a:prstGeom>
+          <a:noFill/>
+        </p:spPr>
+        <p:txBody>
+          <a:bodyPr wrap="square" rtlCol="0">
+            <a:spAutoFit/>
+          </a:bodyPr>
+          <a:lstStyle/>
+          <a:p>
+            <a:r>
+              <a:rPr lang="en-US" dirty="0"/>
+              <a:t>E</a:t>
+            </a:r>
+            <a:r>
+              <a:rPr lang="en-US" dirty="0" smtClean="0"/>
+              <a:t>B</a:t>
+            </a:r>
+            <a:endParaRPr lang="en-US" dirty="0"/>
+          </a:p>
+        </p:txBody>
+      </p:sp>
+      <p:sp>
+        <p:nvSpPr>
+          <p:cNvPr id="29" name="TextBox 28"/>
+          <p:cNvSpPr txBox="1"/>
+          <p:nvPr/>
+        </p:nvSpPr>
+        <p:spPr>
+          <a:xfrm>
+            <a:off x="8250728" y="1704852"/>
+            <a:ext cx="471948" cy="369332"/>
+          </a:xfrm>
+          <a:prstGeom prst="rect">
+            <a:avLst/>
+          </a:prstGeom>
+          <a:noFill/>
+        </p:spPr>
+        <p:txBody>
+          <a:bodyPr wrap="square" rtlCol="0">
+            <a:spAutoFit/>
+          </a:bodyPr>
+          <a:lstStyle/>
+          <a:p>
+            <a:r>
+              <a:rPr lang="en-US" dirty="0"/>
+              <a:t>Z</a:t>
+            </a:r>
+            <a:r>
+              <a:rPr lang="en-US" dirty="0" smtClean="0"/>
+              <a:t>B</a:t>
+            </a:r>
+            <a:endParaRPr lang="en-US" dirty="0"/>
+          </a:p>
+        </p:txBody>
+      </p:sp>
+      <p:cxnSp>
+        <p:nvCxnSpPr>
+          <p:cNvPr id="33" name="Straight Connector 32"/>
+          <p:cNvCxnSpPr/>
+          <p:nvPr/>
+        </p:nvCxnSpPr>
+        <p:spPr>
+          <a:xfrm flipV="1">
+            <a:off x="2212259" y="5533081"/>
+            <a:ext cx="1504334" cy="184666"/>
+          </a:xfrm>
+          <a:prstGeom prst="line">
+            <a:avLst/>
+          </a:prstGeom>
+          <a:ln w="63500" cap="rnd">
+            <a:round/>
+          </a:ln>
+        </p:spPr>
+        <p:style>
+          <a:lnRef idx="1">
+            <a:schemeClr val="dk1"/>
+          </a:lnRef>
+          <a:fillRef idx="0">
+            <a:schemeClr val="dk1"/>
+          </a:fillRef>
+          <a:effectRef idx="0">
+            <a:schemeClr val="dk1"/>
+          </a:effectRef>
+          <a:fontRef idx="minor">
+            <a:schemeClr val="tx1"/>
+          </a:fontRef>
+        </p:style>
+      </p:cxnSp>
+      <p:cxnSp>
+        <p:nvCxnSpPr>
+          <p:cNvPr id="36" name="Straight Connector 35"/>
+          <p:cNvCxnSpPr/>
+          <p:nvPr/>
+        </p:nvCxnSpPr>
+        <p:spPr>
+          <a:xfrm flipV="1">
+            <a:off x="3706761" y="5024178"/>
+            <a:ext cx="1376517" cy="508903"/>
+          </a:xfrm>
+          <a:prstGeom prst="line">
+            <a:avLst/>
+          </a:prstGeom>
+          <a:ln w="63500" cap="rnd">
+            <a:solidFill>
+              <a:schemeClr val="tx1"/>
+            </a:solidFill>
+            <a:round/>
+          </a:ln>
+        </p:spPr>
+        <p:style>
+          <a:lnRef idx="1">
+            <a:schemeClr val="accent1"/>
+          </a:lnRef>
+          <a:fillRef idx="0">
+            <a:schemeClr val="accent1"/>
+          </a:fillRef>
+          <a:effectRef idx="0">
+            <a:schemeClr val="accent1"/>
+          </a:effectRef>
+          <a:fontRef idx="minor">
+            <a:schemeClr val="tx1"/>
+          </a:fontRef>
+        </p:style>
+      </p:cxnSp>
+      <p:cxnSp>
+        <p:nvCxnSpPr>
+          <p:cNvPr id="38" name="Straight Connector 37"/>
+          <p:cNvCxnSpPr/>
+          <p:nvPr/>
+        </p:nvCxnSpPr>
+        <p:spPr>
+          <a:xfrm flipV="1">
+            <a:off x="5063612" y="3678097"/>
+            <a:ext cx="1582992" cy="1355913"/>
+          </a:xfrm>
+          <a:prstGeom prst="line">
+            <a:avLst/>
+          </a:prstGeom>
+          <a:ln w="63500" cap="rnd">
+            <a:solidFill>
+              <a:schemeClr val="tx1"/>
+            </a:solidFill>
+            <a:round/>
+          </a:ln>
+        </p:spPr>
+        <p:style>
+          <a:lnRef idx="1">
+            <a:schemeClr val="accent1"/>
+          </a:lnRef>
+          <a:fillRef idx="0">
+            <a:schemeClr val="accent1"/>
+          </a:fillRef>
+          <a:effectRef idx="0">
+            <a:schemeClr val="accent1"/>
+          </a:effectRef>
+          <a:fontRef idx="minor">
+            <a:schemeClr val="tx1"/>
+          </a:fontRef>
+        </p:style>
+      </p:cxnSp>
+      <p:cxnSp>
+        <p:nvCxnSpPr>
+          <p:cNvPr id="41" name="Straight Connector 40"/>
+          <p:cNvCxnSpPr/>
+          <p:nvPr/>
+        </p:nvCxnSpPr>
+        <p:spPr>
+          <a:xfrm flipV="1">
+            <a:off x="6626940" y="2502597"/>
+            <a:ext cx="1759976" cy="1188748"/>
+          </a:xfrm>
+          <a:prstGeom prst="line">
+            <a:avLst/>
+          </a:prstGeom>
+          <a:ln w="63500" cap="rnd">
+            <a:solidFill>
+              <a:schemeClr val="tx1"/>
+            </a:solidFill>
+            <a:round/>
+          </a:ln>
+        </p:spPr>
+        <p:style>
+          <a:lnRef idx="1">
+            <a:schemeClr val="accent1"/>
+          </a:lnRef>
+          <a:fillRef idx="0">
+            <a:schemeClr val="accent1"/>
+          </a:fillRef>
+          <a:effectRef idx="0">
+            <a:schemeClr val="accent1"/>
+          </a:effectRef>
+          <a:fontRef idx="minor">
+            <a:schemeClr val="tx1"/>
+          </a:fontRef>
+        </p:style>
+      </p:cxnSp>
+      <p:cxnSp>
+        <p:nvCxnSpPr>
+          <p:cNvPr id="43" name="Straight Connector 42"/>
+          <p:cNvCxnSpPr/>
+          <p:nvPr/>
+        </p:nvCxnSpPr>
+        <p:spPr>
+          <a:xfrm flipV="1">
+            <a:off x="8357419" y="1889518"/>
+            <a:ext cx="1561179" cy="636680"/>
+          </a:xfrm>
+          <a:prstGeom prst="line">
+            <a:avLst/>
+          </a:prstGeom>
+          <a:ln w="63500" cap="rnd">
+            <a:solidFill>
+              <a:schemeClr val="tx1"/>
+            </a:solidFill>
+            <a:prstDash val="dash"/>
+            <a:round/>
+          </a:ln>
+        </p:spPr>
+        <p:style>
+          <a:lnRef idx="1">
+            <a:schemeClr val="accent1"/>
+          </a:lnRef>
+          <a:fillRef idx="0">
+            <a:schemeClr val="accent1"/>
+          </a:fillRef>
+          <a:effectRef idx="0">
+            <a:schemeClr val="accent1"/>
+          </a:effectRef>
+          <a:fontRef idx="minor">
+            <a:schemeClr val="tx1"/>
+          </a:fontRef>
+        </p:style>
+      </p:cxnSp>
+      <p:sp>
+        <p:nvSpPr>
+          <p:cNvPr id="44" name="TextBox 43"/>
+          <p:cNvSpPr txBox="1"/>
+          <p:nvPr/>
+        </p:nvSpPr>
+        <p:spPr>
+          <a:xfrm>
+            <a:off x="9627256" y="1221611"/>
+            <a:ext cx="471948" cy="369332"/>
+          </a:xfrm>
+          <a:prstGeom prst="rect">
+            <a:avLst/>
+          </a:prstGeom>
+          <a:noFill/>
+        </p:spPr>
+        <p:txBody>
+          <a:bodyPr wrap="square" rtlCol="0">
+            <a:spAutoFit/>
+          </a:bodyPr>
+          <a:lstStyle/>
+          <a:p>
+            <a:r>
+              <a:rPr lang="en-US" dirty="0" smtClean="0"/>
+              <a:t>YB</a:t>
+            </a:r>
+            <a:endParaRPr lang="en-US" dirty="0"/>
+          </a:p>
+        </p:txBody>
+      </p:sp>
+      <p:sp>
+        <p:nvSpPr>
+          <p:cNvPr id="47" name="TextBox 46"/>
+          <p:cNvSpPr txBox="1"/>
+          <p:nvPr/>
+        </p:nvSpPr>
+        <p:spPr>
+          <a:xfrm>
+            <a:off x="2063700" y="6005709"/>
+            <a:ext cx="707922" cy="307777"/>
+          </a:xfrm>
+          <a:prstGeom prst="rect">
+            <a:avLst/>
+          </a:prstGeom>
+          <a:noFill/>
+        </p:spPr>
+        <p:txBody>
+          <a:bodyPr wrap="square" rtlCol="0">
+            <a:spAutoFit/>
+          </a:bodyPr>
+          <a:lstStyle/>
+          <a:p>
+            <a:r>
+              <a:rPr lang="en-US" sz="1400" dirty="0" smtClean="0"/>
+              <a:t>1985</a:t>
+            </a:r>
+            <a:endParaRPr lang="en-US" sz="1400" dirty="0"/>
+          </a:p>
+        </p:txBody>
+      </p:sp>
+      <p:sp>
+        <p:nvSpPr>
+          <p:cNvPr id="48" name="TextBox 47"/>
+          <p:cNvSpPr txBox="1"/>
+          <p:nvPr/>
+        </p:nvSpPr>
+        <p:spPr>
+          <a:xfrm>
+            <a:off x="8617574" y="6002174"/>
+            <a:ext cx="707922" cy="307777"/>
+          </a:xfrm>
+          <a:prstGeom prst="rect">
+            <a:avLst/>
+          </a:prstGeom>
+          <a:noFill/>
+        </p:spPr>
+        <p:txBody>
+          <a:bodyPr wrap="square" rtlCol="0">
+            <a:spAutoFit/>
+          </a:bodyPr>
+          <a:lstStyle/>
+          <a:p>
+            <a:r>
+              <a:rPr lang="en-US" sz="1400" dirty="0" smtClean="0"/>
+              <a:t>2020</a:t>
+            </a:r>
+            <a:endParaRPr lang="en-US" sz="1400" dirty="0"/>
+          </a:p>
+        </p:txBody>
+      </p:sp>
+      <p:sp>
+        <p:nvSpPr>
+          <p:cNvPr id="49" name="TextBox 48"/>
+          <p:cNvSpPr txBox="1"/>
+          <p:nvPr/>
+        </p:nvSpPr>
+        <p:spPr>
+          <a:xfrm>
+            <a:off x="3079149" y="6005316"/>
+            <a:ext cx="707922" cy="307777"/>
+          </a:xfrm>
+          <a:prstGeom prst="rect">
+            <a:avLst/>
+          </a:prstGeom>
+          <a:noFill/>
+        </p:spPr>
+        <p:txBody>
+          <a:bodyPr wrap="square" rtlCol="0">
+            <a:spAutoFit/>
+          </a:bodyPr>
+          <a:lstStyle/>
+          <a:p>
+            <a:r>
+              <a:rPr lang="en-US" sz="1400" dirty="0" smtClean="0"/>
+              <a:t>1990</a:t>
+            </a:r>
+            <a:endParaRPr lang="en-US" sz="1400" dirty="0"/>
+          </a:p>
+        </p:txBody>
+      </p:sp>
+      <p:sp>
+        <p:nvSpPr>
+          <p:cNvPr id="50" name="TextBox 49"/>
+          <p:cNvSpPr txBox="1"/>
+          <p:nvPr/>
+        </p:nvSpPr>
+        <p:spPr>
+          <a:xfrm>
+            <a:off x="4086418" y="6008294"/>
+            <a:ext cx="707922" cy="307777"/>
+          </a:xfrm>
+          <a:prstGeom prst="rect">
+            <a:avLst/>
+          </a:prstGeom>
+          <a:noFill/>
+        </p:spPr>
+        <p:txBody>
+          <a:bodyPr wrap="square" rtlCol="0">
+            <a:spAutoFit/>
+          </a:bodyPr>
+          <a:lstStyle/>
+          <a:p>
+            <a:r>
+              <a:rPr lang="en-US" sz="1400" dirty="0" smtClean="0"/>
+              <a:t>1995</a:t>
+            </a:r>
+            <a:endParaRPr lang="en-US" sz="1400" dirty="0"/>
+          </a:p>
+        </p:txBody>
+      </p:sp>
+      <p:sp>
+        <p:nvSpPr>
+          <p:cNvPr id="51" name="TextBox 50"/>
+          <p:cNvSpPr txBox="1"/>
+          <p:nvPr/>
+        </p:nvSpPr>
+        <p:spPr>
+          <a:xfrm>
+            <a:off x="5059209" y="6008657"/>
+            <a:ext cx="707922" cy="307777"/>
+          </a:xfrm>
+          <a:prstGeom prst="rect">
+            <a:avLst/>
+          </a:prstGeom>
+          <a:noFill/>
+        </p:spPr>
+        <p:txBody>
+          <a:bodyPr wrap="square" rtlCol="0">
+            <a:spAutoFit/>
+          </a:bodyPr>
+          <a:lstStyle/>
+          <a:p>
+            <a:r>
+              <a:rPr lang="en-US" sz="1400" dirty="0" smtClean="0"/>
+              <a:t>2000</a:t>
+            </a:r>
+            <a:endParaRPr lang="en-US" sz="1400" dirty="0"/>
+          </a:p>
+        </p:txBody>
+      </p:sp>
+      <p:sp>
+        <p:nvSpPr>
+          <p:cNvPr id="52" name="TextBox 51"/>
+          <p:cNvSpPr txBox="1"/>
+          <p:nvPr/>
+        </p:nvSpPr>
+        <p:spPr>
+          <a:xfrm>
+            <a:off x="5938682" y="6005316"/>
+            <a:ext cx="707922" cy="307777"/>
+          </a:xfrm>
+          <a:prstGeom prst="rect">
+            <a:avLst/>
+          </a:prstGeom>
+          <a:noFill/>
+        </p:spPr>
+        <p:txBody>
+          <a:bodyPr wrap="square" rtlCol="0">
+            <a:spAutoFit/>
+          </a:bodyPr>
+          <a:lstStyle/>
+          <a:p>
+            <a:r>
+              <a:rPr lang="en-US" sz="1400" dirty="0" smtClean="0"/>
+              <a:t>2005</a:t>
+            </a:r>
+            <a:endParaRPr lang="en-US" sz="1400" dirty="0"/>
+          </a:p>
+        </p:txBody>
+      </p:sp>
+      <p:sp>
+        <p:nvSpPr>
+          <p:cNvPr id="53" name="TextBox 52"/>
+          <p:cNvSpPr txBox="1"/>
+          <p:nvPr/>
+        </p:nvSpPr>
+        <p:spPr>
+          <a:xfrm>
+            <a:off x="6805734" y="6002174"/>
+            <a:ext cx="707922" cy="307777"/>
+          </a:xfrm>
+          <a:prstGeom prst="rect">
+            <a:avLst/>
+          </a:prstGeom>
+          <a:noFill/>
+        </p:spPr>
+        <p:txBody>
+          <a:bodyPr wrap="square" rtlCol="0">
+            <a:spAutoFit/>
+          </a:bodyPr>
+          <a:lstStyle/>
+          <a:p>
+            <a:r>
+              <a:rPr lang="en-US" sz="1400" dirty="0" smtClean="0"/>
+              <a:t>2010</a:t>
+            </a:r>
+            <a:endParaRPr lang="en-US" sz="1400" dirty="0"/>
+          </a:p>
+        </p:txBody>
+      </p:sp>
+      <p:sp>
+        <p:nvSpPr>
+          <p:cNvPr id="54" name="TextBox 53"/>
+          <p:cNvSpPr txBox="1"/>
+          <p:nvPr/>
+        </p:nvSpPr>
+        <p:spPr>
+          <a:xfrm>
+            <a:off x="7672786" y="6002174"/>
+            <a:ext cx="707922" cy="307777"/>
+          </a:xfrm>
+          <a:prstGeom prst="rect">
+            <a:avLst/>
+          </a:prstGeom>
+          <a:noFill/>
+        </p:spPr>
+        <p:txBody>
+          <a:bodyPr wrap="square" rtlCol="0">
+            <a:spAutoFit/>
+          </a:bodyPr>
+          <a:lstStyle/>
+          <a:p>
+            <a:r>
+              <a:rPr lang="en-US" sz="1400" dirty="0" smtClean="0"/>
+              <a:t>2015</a:t>
+            </a:r>
+            <a:endParaRPr lang="en-US" sz="1400" dirty="0"/>
+          </a:p>
+        </p:txBody>
+      </p:sp>
+    </p:spTree>
+    <p:extLst>
+      <p:ext uri="{BB962C8B-B14F-4D97-AF65-F5344CB8AC3E}">
+        <p14:creationId xmlns:p14="http://schemas.microsoft.com/office/powerpoint/2010/main" val="4252931960"/>
       </p:ext>
     </p:extLst>
   </p:cSld>

</xml_diff>